<commit_message>
restructure class to add new serverless lecture
</commit_message>
<xml_diff>
--- a/lectures/lecture-review-week-8.pptx
+++ b/lectures/lecture-review-week-8.pptx
@@ -7,14 +7,13 @@
   <p:sldIdLst>
     <p:sldId id="257" r:id="rId2"/>
     <p:sldId id="260" r:id="rId3"/>
-    <p:sldId id="268" r:id="rId4"/>
-    <p:sldId id="261" r:id="rId5"/>
-    <p:sldId id="262" r:id="rId6"/>
-    <p:sldId id="263" r:id="rId7"/>
-    <p:sldId id="265" r:id="rId8"/>
-    <p:sldId id="266" r:id="rId9"/>
-    <p:sldId id="264" r:id="rId10"/>
-    <p:sldId id="269" r:id="rId11"/>
+    <p:sldId id="261" r:id="rId4"/>
+    <p:sldId id="262" r:id="rId5"/>
+    <p:sldId id="263" r:id="rId6"/>
+    <p:sldId id="265" r:id="rId7"/>
+    <p:sldId id="266" r:id="rId8"/>
+    <p:sldId id="264" r:id="rId9"/>
+    <p:sldId id="269" r:id="rId10"/>
   </p:sldIdLst>
   <p:sldSz cx="12192000" cy="6858000"/>
   <p:notesSz cx="6858000" cy="9144000"/>
@@ -268,7 +267,7 @@
           <a:p>
             <a:fld id="{DAC1E4EF-1A07-8740-80B6-D041CCD5E262}" type="datetimeFigureOut">
               <a:rPr lang="en-US" smtClean="0"/>
-              <a:t>3/19/18</a:t>
+              <a:t>8/8/18</a:t>
             </a:fld>
             <a:endParaRPr lang="en-US"/>
           </a:p>
@@ -466,7 +465,7 @@
           <a:p>
             <a:fld id="{DAC1E4EF-1A07-8740-80B6-D041CCD5E262}" type="datetimeFigureOut">
               <a:rPr lang="en-US" smtClean="0"/>
-              <a:t>3/19/18</a:t>
+              <a:t>8/8/18</a:t>
             </a:fld>
             <a:endParaRPr lang="en-US"/>
           </a:p>
@@ -674,7 +673,7 @@
           <a:p>
             <a:fld id="{DAC1E4EF-1A07-8740-80B6-D041CCD5E262}" type="datetimeFigureOut">
               <a:rPr lang="en-US" smtClean="0"/>
-              <a:t>3/19/18</a:t>
+              <a:t>8/8/18</a:t>
             </a:fld>
             <a:endParaRPr lang="en-US"/>
           </a:p>
@@ -872,7 +871,7 @@
           <a:p>
             <a:fld id="{DAC1E4EF-1A07-8740-80B6-D041CCD5E262}" type="datetimeFigureOut">
               <a:rPr lang="en-US" smtClean="0"/>
-              <a:t>3/19/18</a:t>
+              <a:t>8/8/18</a:t>
             </a:fld>
             <a:endParaRPr lang="en-US"/>
           </a:p>
@@ -1147,7 +1146,7 @@
           <a:p>
             <a:fld id="{DAC1E4EF-1A07-8740-80B6-D041CCD5E262}" type="datetimeFigureOut">
               <a:rPr lang="en-US" smtClean="0"/>
-              <a:t>3/19/18</a:t>
+              <a:t>8/8/18</a:t>
             </a:fld>
             <a:endParaRPr lang="en-US"/>
           </a:p>
@@ -1412,7 +1411,7 @@
           <a:p>
             <a:fld id="{DAC1E4EF-1A07-8740-80B6-D041CCD5E262}" type="datetimeFigureOut">
               <a:rPr lang="en-US" smtClean="0"/>
-              <a:t>3/19/18</a:t>
+              <a:t>8/8/18</a:t>
             </a:fld>
             <a:endParaRPr lang="en-US"/>
           </a:p>
@@ -1824,7 +1823,7 @@
           <a:p>
             <a:fld id="{DAC1E4EF-1A07-8740-80B6-D041CCD5E262}" type="datetimeFigureOut">
               <a:rPr lang="en-US" smtClean="0"/>
-              <a:t>3/19/18</a:t>
+              <a:t>8/8/18</a:t>
             </a:fld>
             <a:endParaRPr lang="en-US"/>
           </a:p>
@@ -1965,7 +1964,7 @@
           <a:p>
             <a:fld id="{DAC1E4EF-1A07-8740-80B6-D041CCD5E262}" type="datetimeFigureOut">
               <a:rPr lang="en-US" smtClean="0"/>
-              <a:t>3/19/18</a:t>
+              <a:t>8/8/18</a:t>
             </a:fld>
             <a:endParaRPr lang="en-US"/>
           </a:p>
@@ -2078,7 +2077,7 @@
           <a:p>
             <a:fld id="{DAC1E4EF-1A07-8740-80B6-D041CCD5E262}" type="datetimeFigureOut">
               <a:rPr lang="en-US" smtClean="0"/>
-              <a:t>3/19/18</a:t>
+              <a:t>8/8/18</a:t>
             </a:fld>
             <a:endParaRPr lang="en-US"/>
           </a:p>
@@ -2389,7 +2388,7 @@
           <a:p>
             <a:fld id="{DAC1E4EF-1A07-8740-80B6-D041CCD5E262}" type="datetimeFigureOut">
               <a:rPr lang="en-US" smtClean="0"/>
-              <a:t>3/19/18</a:t>
+              <a:t>8/8/18</a:t>
             </a:fld>
             <a:endParaRPr lang="en-US"/>
           </a:p>
@@ -2677,7 +2676,7 @@
           <a:p>
             <a:fld id="{DAC1E4EF-1A07-8740-80B6-D041CCD5E262}" type="datetimeFigureOut">
               <a:rPr lang="en-US" smtClean="0"/>
-              <a:t>3/19/18</a:t>
+              <a:t>8/8/18</a:t>
             </a:fld>
             <a:endParaRPr lang="en-US"/>
           </a:p>
@@ -2918,7 +2917,7 @@
           <a:p>
             <a:fld id="{DAC1E4EF-1A07-8740-80B6-D041CCD5E262}" type="datetimeFigureOut">
               <a:rPr lang="en-US" smtClean="0"/>
-              <a:t>3/19/18</a:t>
+              <a:t>8/8/18</a:t>
             </a:fld>
             <a:endParaRPr lang="en-US"/>
           </a:p>
@@ -3475,118 +3474,6 @@
 </p:sld>
 </file>
 
-<file path=ppt/slides/slide10.xml><?xml version="1.0" encoding="utf-8"?>
-<p:sld xmlns:a="http://schemas.openxmlformats.org/drawingml/2006/main" xmlns:r="http://schemas.openxmlformats.org/officeDocument/2006/relationships" xmlns:p="http://schemas.openxmlformats.org/presentationml/2006/main">
-  <p:cSld>
-    <p:spTree>
-      <p:nvGrpSpPr>
-        <p:cNvPr id="1" name=""/>
-        <p:cNvGrpSpPr/>
-        <p:nvPr/>
-      </p:nvGrpSpPr>
-      <p:grpSpPr>
-        <a:xfrm>
-          <a:off x="0" y="0"/>
-          <a:ext cx="0" cy="0"/>
-          <a:chOff x="0" y="0"/>
-          <a:chExt cx="0" cy="0"/>
-        </a:xfrm>
-      </p:grpSpPr>
-      <p:sp>
-        <p:nvSpPr>
-          <p:cNvPr id="2" name="Title 1">
-            <a:extLst>
-              <a:ext uri="{FF2B5EF4-FFF2-40B4-BE49-F238E27FC236}">
-                <a16:creationId xmlns:a16="http://schemas.microsoft.com/office/drawing/2014/main" id="{E13FF194-DC87-3B42-A050-6E8E5B014760}"/>
-              </a:ext>
-            </a:extLst>
-          </p:cNvPr>
-          <p:cNvSpPr>
-            <a:spLocks noGrp="1"/>
-          </p:cNvSpPr>
-          <p:nvPr>
-            <p:ph type="title"/>
-          </p:nvPr>
-        </p:nvSpPr>
-        <p:spPr/>
-        <p:txBody>
-          <a:bodyPr/>
-          <a:lstStyle/>
-          <a:p>
-            <a:r>
-              <a:rPr lang="en-US" dirty="0"/>
-              <a:t>Classroom Project</a:t>
-            </a:r>
-          </a:p>
-        </p:txBody>
-      </p:sp>
-      <p:sp>
-        <p:nvSpPr>
-          <p:cNvPr id="3" name="Content Placeholder 2">
-            <a:extLst>
-              <a:ext uri="{FF2B5EF4-FFF2-40B4-BE49-F238E27FC236}">
-                <a16:creationId xmlns:a16="http://schemas.microsoft.com/office/drawing/2014/main" id="{49A699BF-6AED-7348-9DA9-0B24E933E6E3}"/>
-              </a:ext>
-            </a:extLst>
-          </p:cNvPr>
-          <p:cNvSpPr>
-            <a:spLocks noGrp="1"/>
-          </p:cNvSpPr>
-          <p:nvPr>
-            <p:ph idx="1"/>
-          </p:nvPr>
-        </p:nvSpPr>
-        <p:spPr/>
-        <p:txBody>
-          <a:bodyPr/>
-          <a:lstStyle/>
-          <a:p>
-            <a:r>
-              <a:rPr lang="en-US" dirty="0"/>
-              <a:t>Overview: </a:t>
-            </a:r>
-          </a:p>
-          <a:p>
-            <a:pPr lvl="1"/>
-            <a:r>
-              <a:rPr lang="en-US" dirty="0"/>
-              <a:t>Quick overview of Jenkins CI/CD</a:t>
-            </a:r>
-          </a:p>
-          <a:p>
-            <a:pPr lvl="1"/>
-            <a:r>
-              <a:rPr lang="en-US" dirty="0"/>
-              <a:t>Build a small infrastructure pipeline which launches an EC2 instance.</a:t>
-            </a:r>
-          </a:p>
-          <a:p>
-            <a:endParaRPr lang="en-US" dirty="0"/>
-          </a:p>
-          <a:p>
-            <a:r>
-              <a:rPr lang="en-US" dirty="0"/>
-              <a:t>Show me your work when completed!</a:t>
-            </a:r>
-          </a:p>
-          <a:p>
-            <a:endParaRPr lang="en-US" dirty="0"/>
-          </a:p>
-        </p:txBody>
-      </p:sp>
-    </p:spTree>
-    <p:extLst>
-      <p:ext uri="{BB962C8B-B14F-4D97-AF65-F5344CB8AC3E}">
-        <p14:creationId xmlns:p14="http://schemas.microsoft.com/office/powerpoint/2010/main" val="1208524681"/>
-      </p:ext>
-    </p:extLst>
-  </p:cSld>
-  <p:clrMapOvr>
-    <a:masterClrMapping/>
-  </p:clrMapOvr>
-</p:sld>
-</file>
-
 <file path=ppt/slides/slide2.xml><?xml version="1.0" encoding="utf-8"?>
 <p:sld xmlns:a="http://schemas.openxmlformats.org/drawingml/2006/main" xmlns:r="http://schemas.openxmlformats.org/officeDocument/2006/relationships" xmlns:p="http://schemas.openxmlformats.org/presentationml/2006/main">
   <p:cSld>
@@ -3751,7 +3638,7 @@
           <p:cNvPr id="2" name="Title 1">
             <a:extLst>
               <a:ext uri="{FF2B5EF4-FFF2-40B4-BE49-F238E27FC236}">
-                <a16:creationId xmlns:a16="http://schemas.microsoft.com/office/drawing/2014/main" id="{549C8C02-344B-D444-B2ED-AF05365FDB9A}"/>
+                <a16:creationId xmlns:a16="http://schemas.microsoft.com/office/drawing/2014/main" id="{0369C4F5-37BB-544F-875F-E71CCBC7783F}"/>
               </a:ext>
             </a:extLst>
           </p:cNvPr>
@@ -3769,7 +3656,7 @@
           <a:p>
             <a:r>
               <a:rPr lang="en-US" dirty="0"/>
-              <a:t>Challenge Review</a:t>
+              <a:t>Lecture Review</a:t>
             </a:r>
           </a:p>
         </p:txBody>
@@ -3779,7 +3666,7 @@
           <p:cNvPr id="3" name="Content Placeholder 2">
             <a:extLst>
               <a:ext uri="{FF2B5EF4-FFF2-40B4-BE49-F238E27FC236}">
-                <a16:creationId xmlns:a16="http://schemas.microsoft.com/office/drawing/2014/main" id="{13DCA43B-2B43-5348-9DE4-C461B06C83A1}"/>
+                <a16:creationId xmlns:a16="http://schemas.microsoft.com/office/drawing/2014/main" id="{7B34BD81-0456-EE4A-8044-57DBD9B85993}"/>
               </a:ext>
             </a:extLst>
           </p:cNvPr>
@@ -3792,90 +3679,75 @@
         </p:nvSpPr>
         <p:spPr/>
         <p:txBody>
-          <a:bodyPr/>
-          <a:lstStyle/>
-          <a:p>
-            <a:r>
-              <a:rPr lang="en-US" dirty="0"/>
-              <a:t>Changes made based on feedback from challenge:</a:t>
+          <a:bodyPr>
+            <a:normAutofit lnSpcReduction="10000"/>
+          </a:bodyPr>
+          <a:lstStyle/>
+          <a:p>
+            <a:r>
+              <a:rPr lang="en-US" dirty="0"/>
+              <a:t>DevOps: collaborative effort to improve quality and velocity of service delivery</a:t>
+            </a:r>
+          </a:p>
+          <a:p>
+            <a:r>
+              <a:rPr lang="en-US" dirty="0"/>
+              <a:t>Development vs. Operations</a:t>
             </a:r>
           </a:p>
           <a:p>
             <a:pPr lvl="1"/>
             <a:r>
               <a:rPr lang="en-US" dirty="0"/>
-              <a:t>Switch from us-east-1 to us-east-2</a:t>
-            </a:r>
-          </a:p>
-          <a:p>
-            <a:pPr lvl="2"/>
-            <a:r>
-              <a:rPr lang="en-US" dirty="0"/>
-              <a:t>Avoid service limit issues (only 5 EIP's allowed by default in region)</a:t>
-            </a:r>
-          </a:p>
-          <a:p>
-            <a:pPr lvl="2"/>
-            <a:r>
-              <a:rPr lang="en-US" dirty="0"/>
-              <a:t>Some students had deleted most of their default VPC subnets!</a:t>
+              <a:t>Different goals and measures of success</a:t>
+            </a:r>
+          </a:p>
+          <a:p>
+            <a:r>
+              <a:rPr lang="en-US" dirty="0"/>
+              <a:t>3 pillars of DevOps</a:t>
             </a:r>
           </a:p>
           <a:p>
             <a:pPr lvl="1"/>
             <a:r>
               <a:rPr lang="en-US" dirty="0"/>
-              <a:t>Correct minor naming inconsistencies</a:t>
+              <a:t>Culture</a:t>
             </a:r>
           </a:p>
           <a:p>
             <a:pPr lvl="1"/>
             <a:r>
               <a:rPr lang="en-US" dirty="0"/>
-              <a:t>Update security group diagram description</a:t>
+              <a:t>Automation</a:t>
             </a:r>
           </a:p>
           <a:p>
             <a:pPr lvl="1"/>
             <a:r>
               <a:rPr lang="en-US" dirty="0"/>
-              <a:t>Eliminate need to provide AWS credentials to run script</a:t>
+              <a:t>Measurement</a:t>
+            </a:r>
+          </a:p>
+          <a:p>
+            <a:r>
+              <a:rPr lang="en-US" dirty="0"/>
+              <a:t>DevOps Culture</a:t>
             </a:r>
           </a:p>
           <a:p>
             <a:pPr lvl="1"/>
             <a:r>
               <a:rPr lang="en-US" dirty="0"/>
-              <a:t>Update services to automatically restart if accidentally killed (yum update)</a:t>
-            </a:r>
-          </a:p>
-          <a:p>
-            <a:pPr marL="457200" lvl="1" indent="0">
-              <a:buNone/>
-            </a:pPr>
-            <a:r>
-              <a:rPr lang="en-US" dirty="0"/>
-              <a:t>	</a:t>
-            </a:r>
-          </a:p>
-          <a:p>
-            <a:pPr marL="457200" lvl="1" indent="0">
-              <a:buNone/>
-            </a:pPr>
-            <a:endParaRPr lang="en-US" dirty="0"/>
-          </a:p>
-          <a:p>
-            <a:pPr marL="457200" lvl="1" indent="0">
-              <a:buNone/>
-            </a:pPr>
-            <a:endParaRPr lang="en-US" dirty="0"/>
+              <a:t>Collaborative, Transparent, Change Oriented</a:t>
+            </a:r>
           </a:p>
         </p:txBody>
       </p:sp>
     </p:spTree>
     <p:extLst>
       <p:ext uri="{BB962C8B-B14F-4D97-AF65-F5344CB8AC3E}">
-        <p14:creationId xmlns:p14="http://schemas.microsoft.com/office/powerpoint/2010/main" val="261193460"/>
+        <p14:creationId xmlns:p14="http://schemas.microsoft.com/office/powerpoint/2010/main" val="4123388909"/>
       </p:ext>
     </p:extLst>
   </p:cSld>
@@ -3955,60 +3827,95 @@
           <a:p>
             <a:r>
               <a:rPr lang="en-US" dirty="0"/>
-              <a:t>DevOps: collaborative effort to improve quality and velocity of service delivery</a:t>
-            </a:r>
-          </a:p>
-          <a:p>
-            <a:r>
-              <a:rPr lang="en-US" dirty="0"/>
-              <a:t>Development vs. Operations</a:t>
+              <a:t>DevOps = Lean for IT</a:t>
+            </a:r>
+          </a:p>
+          <a:p>
+            <a:r>
+              <a:rPr lang="en-US" dirty="0"/>
+              <a:t>Lean</a:t>
             </a:r>
           </a:p>
           <a:p>
             <a:pPr lvl="1"/>
             <a:r>
               <a:rPr lang="en-US" dirty="0"/>
-              <a:t>Different goals and measures of success</a:t>
-            </a:r>
-          </a:p>
-          <a:p>
-            <a:r>
-              <a:rPr lang="en-US" dirty="0"/>
-              <a:t>3 pillars of DevOps</a:t>
+              <a:t>Theory of constraints</a:t>
             </a:r>
           </a:p>
           <a:p>
             <a:pPr lvl="1"/>
             <a:r>
               <a:rPr lang="en-US" dirty="0"/>
-              <a:t>Culture</a:t>
+              <a:t>Queuing theory</a:t>
+            </a:r>
+          </a:p>
+          <a:p>
+            <a:pPr lvl="2"/>
+            <a:r>
+              <a:rPr lang="en-US" dirty="0"/>
+              <a:t>Software dev is non-linear and non-deterministic</a:t>
+            </a:r>
+          </a:p>
+          <a:p>
+            <a:pPr lvl="2"/>
+            <a:r>
+              <a:rPr lang="en-US" dirty="0"/>
+              <a:t>Increasing utilization decreases velocity!</a:t>
             </a:r>
           </a:p>
           <a:p>
             <a:pPr lvl="1"/>
             <a:r>
               <a:rPr lang="en-US" dirty="0"/>
-              <a:t>Automation</a:t>
+              <a:t>Little's Law</a:t>
+            </a:r>
+          </a:p>
+          <a:p>
+            <a:pPr lvl="2"/>
+            <a:r>
+              <a:rPr lang="en-US" dirty="0"/>
+              <a:t>Only way to </a:t>
+            </a:r>
+            <a:r>
+              <a:rPr lang="en-US" u="sng" dirty="0"/>
+              <a:t>maximize</a:t>
+            </a:r>
+            <a:r>
+              <a:rPr lang="en-US" dirty="0"/>
+              <a:t> throughput is by using </a:t>
+            </a:r>
+            <a:r>
+              <a:rPr lang="en-US" u="sng" dirty="0"/>
+              <a:t>small</a:t>
+            </a:r>
+            <a:r>
+              <a:rPr lang="en-US" dirty="0"/>
+              <a:t> batch sizes.</a:t>
+            </a:r>
+          </a:p>
+          <a:p>
+            <a:r>
+              <a:rPr lang="en-US" dirty="0"/>
+              <a:t>Design for Operations</a:t>
             </a:r>
           </a:p>
           <a:p>
             <a:pPr lvl="1"/>
             <a:r>
               <a:rPr lang="en-US" dirty="0"/>
-              <a:t>Measurement</a:t>
-            </a:r>
-          </a:p>
-          <a:p>
-            <a:r>
-              <a:rPr lang="en-US" dirty="0"/>
-              <a:t>DevOps Culture</a:t>
+              <a:t>Operations participates in dev meetings</a:t>
             </a:r>
           </a:p>
           <a:p>
             <a:pPr lvl="1"/>
             <a:r>
-              <a:rPr lang="en-US" dirty="0"/>
-              <a:t>Collaborative, Transparent, Change Oriented</a:t>
+              <a:rPr lang="en-US" dirty="0" err="1"/>
+              <a:t>Devs</a:t>
+            </a:r>
+            <a:r>
+              <a:rPr lang="en-US" dirty="0"/>
+              <a:t> participate in service delivery.</a:t>
             </a:r>
           </a:p>
         </p:txBody>
@@ -4016,7 +3923,7 @@
     </p:spTree>
     <p:extLst>
       <p:ext uri="{BB962C8B-B14F-4D97-AF65-F5344CB8AC3E}">
-        <p14:creationId xmlns:p14="http://schemas.microsoft.com/office/powerpoint/2010/main" val="4123388909"/>
+        <p14:creationId xmlns:p14="http://schemas.microsoft.com/office/powerpoint/2010/main" val="3943946959"/>
       </p:ext>
     </p:extLst>
   </p:cSld>
@@ -4096,95 +4003,75 @@
           <a:p>
             <a:r>
               <a:rPr lang="en-US" dirty="0"/>
-              <a:t>DevOps = Lean for IT</a:t>
-            </a:r>
-          </a:p>
-          <a:p>
-            <a:r>
-              <a:rPr lang="en-US" dirty="0"/>
-              <a:t>Lean</a:t>
+              <a:t>Transparency</a:t>
             </a:r>
           </a:p>
           <a:p>
             <a:pPr lvl="1"/>
             <a:r>
               <a:rPr lang="en-US" dirty="0"/>
-              <a:t>Theory of constraints</a:t>
+              <a:t>Anyone can stop the manufacturing line at any time.</a:t>
             </a:r>
           </a:p>
           <a:p>
             <a:pPr lvl="1"/>
             <a:r>
               <a:rPr lang="en-US" dirty="0"/>
-              <a:t>Queuing theory</a:t>
+              <a:t>#1 priority is to fix the build.</a:t>
+            </a:r>
+          </a:p>
+          <a:p>
+            <a:pPr lvl="1"/>
+            <a:r>
+              <a:rPr lang="en-US" dirty="0"/>
+              <a:t>Issues are addressed at postmortem meetings</a:t>
             </a:r>
           </a:p>
           <a:p>
             <a:pPr lvl="2"/>
             <a:r>
               <a:rPr lang="en-US" dirty="0"/>
-              <a:t>Software dev is non-linear and non-deterministic</a:t>
-            </a:r>
-          </a:p>
-          <a:p>
-            <a:pPr lvl="2"/>
-            <a:r>
-              <a:rPr lang="en-US" dirty="0"/>
-              <a:t>Increasing utilization decreases velocity!</a:t>
+              <a:t>Blameless environment</a:t>
+            </a:r>
+          </a:p>
+          <a:p>
+            <a:r>
+              <a:rPr lang="en-US" dirty="0"/>
+              <a:t>Embracing change</a:t>
             </a:r>
           </a:p>
           <a:p>
             <a:pPr lvl="1"/>
             <a:r>
               <a:rPr lang="en-US" dirty="0"/>
-              <a:t>Little's Law</a:t>
-            </a:r>
-          </a:p>
-          <a:p>
-            <a:pPr lvl="2"/>
-            <a:r>
-              <a:rPr lang="en-US" dirty="0"/>
-              <a:t>Only way to </a:t>
-            </a:r>
-            <a:r>
-              <a:rPr lang="en-US" u="sng" dirty="0"/>
-              <a:t>maximize</a:t>
-            </a:r>
-            <a:r>
-              <a:rPr lang="en-US" dirty="0"/>
-              <a:t> throughput is by using </a:t>
-            </a:r>
-            <a:r>
-              <a:rPr lang="en-US" u="sng" dirty="0"/>
-              <a:t>small</a:t>
-            </a:r>
-            <a:r>
-              <a:rPr lang="en-US" dirty="0"/>
-              <a:t> batch sizes.</a:t>
-            </a:r>
-          </a:p>
-          <a:p>
-            <a:r>
-              <a:rPr lang="en-US" dirty="0"/>
-              <a:t>Design for Operations</a:t>
+              <a:t>The more we change the better we get at it.</a:t>
             </a:r>
           </a:p>
           <a:p>
             <a:pPr lvl="1"/>
             <a:r>
               <a:rPr lang="en-US" dirty="0"/>
-              <a:t>Operations participates in dev meetings</a:t>
+              <a:t>Delaying change leads to bigger batch sizes which leads to greater risk!</a:t>
+            </a:r>
+          </a:p>
+          <a:p>
+            <a:r>
+              <a:rPr lang="en-US" dirty="0"/>
+              <a:t>Automation</a:t>
             </a:r>
           </a:p>
           <a:p>
             <a:pPr lvl="1"/>
             <a:r>
-              <a:rPr lang="en-US" dirty="0" err="1"/>
-              <a:t>Devs</a:t>
-            </a:r>
-            <a:r>
-              <a:rPr lang="en-US" dirty="0"/>
-              <a:t> participate in service delivery.</a:t>
+              <a:rPr lang="en-US" dirty="0"/>
+              <a:t>Automate everything!</a:t>
+            </a:r>
+          </a:p>
+          <a:p>
+            <a:pPr lvl="1"/>
+            <a:r>
+              <a:rPr lang="en-US" dirty="0"/>
+              <a:t>Software assembly lines (pipelines)</a:t>
             </a:r>
           </a:p>
         </p:txBody>
@@ -4192,7 +4079,7 @@
     </p:spTree>
     <p:extLst>
       <p:ext uri="{BB962C8B-B14F-4D97-AF65-F5344CB8AC3E}">
-        <p14:creationId xmlns:p14="http://schemas.microsoft.com/office/powerpoint/2010/main" val="3943946959"/>
+        <p14:creationId xmlns:p14="http://schemas.microsoft.com/office/powerpoint/2010/main" val="3413926875"/>
       </p:ext>
     </p:extLst>
   </p:cSld>
@@ -4266,89 +4153,93 @@
         <p:spPr/>
         <p:txBody>
           <a:bodyPr>
-            <a:normAutofit lnSpcReduction="10000"/>
+            <a:normAutofit fontScale="92500" lnSpcReduction="10000"/>
           </a:bodyPr>
           <a:lstStyle/>
           <a:p>
             <a:r>
               <a:rPr lang="en-US" dirty="0"/>
-              <a:t>Transparency</a:t>
+              <a:t>Testing</a:t>
             </a:r>
           </a:p>
           <a:p>
             <a:pPr lvl="1"/>
             <a:r>
               <a:rPr lang="en-US" dirty="0"/>
-              <a:t>Anyone can stop the manufacturing line at any time.</a:t>
+              <a:t>Lean: Shift Left</a:t>
             </a:r>
           </a:p>
           <a:p>
             <a:pPr lvl="1"/>
             <a:r>
               <a:rPr lang="en-US" dirty="0"/>
-              <a:t>#1 priority is to fix the build.</a:t>
+              <a:t>Build quality into the product vs. depending on inspection.</a:t>
             </a:r>
           </a:p>
           <a:p>
             <a:pPr lvl="1"/>
             <a:r>
               <a:rPr lang="en-US" dirty="0"/>
-              <a:t>Issues are addressed at postmortem meetings</a:t>
-            </a:r>
-          </a:p>
-          <a:p>
-            <a:pPr lvl="2"/>
-            <a:r>
-              <a:rPr lang="en-US" dirty="0"/>
-              <a:t>Blameless environment</a:t>
-            </a:r>
-          </a:p>
-          <a:p>
-            <a:r>
-              <a:rPr lang="en-US" dirty="0"/>
-              <a:t>Embracing change</a:t>
+              <a:t>Ice Cream Cone Anti-Pattern</a:t>
+            </a:r>
+          </a:p>
+          <a:p>
+            <a:r>
+              <a:rPr lang="en-US" dirty="0"/>
+              <a:t>Continuous Integration</a:t>
             </a:r>
           </a:p>
           <a:p>
             <a:pPr lvl="1"/>
             <a:r>
               <a:rPr lang="en-US" dirty="0"/>
-              <a:t>The more we change the better we get at it.</a:t>
+              <a:t>All </a:t>
+            </a:r>
+            <a:r>
+              <a:rPr lang="en-US" dirty="0" err="1"/>
+              <a:t>devs</a:t>
+            </a:r>
+            <a:r>
+              <a:rPr lang="en-US" dirty="0"/>
+              <a:t> commit changes to a single mainline branch throughout the day.</a:t>
             </a:r>
           </a:p>
           <a:p>
             <a:pPr lvl="1"/>
             <a:r>
               <a:rPr lang="en-US" dirty="0"/>
-              <a:t>Delaying change leads to bigger batch sizes which leads to greater risk!</a:t>
-            </a:r>
-          </a:p>
-          <a:p>
-            <a:r>
-              <a:rPr lang="en-US" dirty="0"/>
-              <a:t>Automation</a:t>
+              <a:t>All commits generate a build.</a:t>
             </a:r>
           </a:p>
           <a:p>
             <a:pPr lvl="1"/>
             <a:r>
               <a:rPr lang="en-US" dirty="0"/>
-              <a:t>Automate everything!</a:t>
+              <a:t>All builds are tested and potentially releasable.</a:t>
+            </a:r>
+          </a:p>
+          <a:p>
+            <a:r>
+              <a:rPr lang="en-US" dirty="0"/>
+              <a:t>Continuous Delivery: a process which generates a build which may be released.</a:t>
+            </a:r>
+          </a:p>
+          <a:p>
+            <a:r>
+              <a:rPr lang="en-US" dirty="0"/>
+              <a:t>Continuous Deployment: a process which actually deploys a build.</a:t>
             </a:r>
           </a:p>
           <a:p>
             <a:pPr lvl="1"/>
-            <a:r>
-              <a:rPr lang="en-US" dirty="0"/>
-              <a:t>Software assembly lines (pipelines)</a:t>
-            </a:r>
+            <a:endParaRPr lang="en-US" dirty="0"/>
           </a:p>
         </p:txBody>
       </p:sp>
     </p:spTree>
     <p:extLst>
       <p:ext uri="{BB962C8B-B14F-4D97-AF65-F5344CB8AC3E}">
-        <p14:creationId xmlns:p14="http://schemas.microsoft.com/office/powerpoint/2010/main" val="3413926875"/>
+        <p14:creationId xmlns:p14="http://schemas.microsoft.com/office/powerpoint/2010/main" val="606293750"/>
       </p:ext>
     </p:extLst>
   </p:cSld>
@@ -4422,85 +4313,92 @@
         <p:spPr/>
         <p:txBody>
           <a:bodyPr>
-            <a:normAutofit fontScale="92500" lnSpcReduction="10000"/>
+            <a:normAutofit/>
           </a:bodyPr>
           <a:lstStyle/>
           <a:p>
             <a:r>
               <a:rPr lang="en-US" dirty="0"/>
-              <a:t>Testing</a:t>
+              <a:t>Infrastructure as Code</a:t>
             </a:r>
           </a:p>
           <a:p>
             <a:pPr lvl="1"/>
             <a:r>
               <a:rPr lang="en-US" dirty="0"/>
-              <a:t>Lean: Shift Left</a:t>
+              <a:t>We can use software development practices to build infrastructure.</a:t>
             </a:r>
           </a:p>
           <a:p>
             <a:pPr lvl="1"/>
             <a:r>
               <a:rPr lang="en-US" dirty="0"/>
-              <a:t>Build quality into the product vs. depending on inspection.</a:t>
+              <a:t>Version control, </a:t>
+            </a:r>
+            <a:r>
+              <a:rPr lang="en-US" dirty="0" err="1"/>
+              <a:t>linting</a:t>
+            </a:r>
+            <a:r>
+              <a:rPr lang="en-US" dirty="0"/>
+              <a:t>, integration tests, build pipelines</a:t>
+            </a:r>
+          </a:p>
+          <a:p>
+            <a:r>
+              <a:rPr lang="en-US" dirty="0"/>
+              <a:t>Metrics</a:t>
             </a:r>
           </a:p>
           <a:p>
             <a:pPr lvl="1"/>
             <a:r>
               <a:rPr lang="en-US" dirty="0"/>
-              <a:t>Ice Cream Cone Anti-Pattern</a:t>
-            </a:r>
-          </a:p>
-          <a:p>
-            <a:r>
-              <a:rPr lang="en-US" dirty="0"/>
-              <a:t>Continuous Integration</a:t>
+              <a:t>We fanatically collect data.</a:t>
             </a:r>
           </a:p>
           <a:p>
             <a:pPr lvl="1"/>
             <a:r>
               <a:rPr lang="en-US" dirty="0"/>
-              <a:t>All </a:t>
+              <a:t>All decisions are supported by data.</a:t>
+            </a:r>
+          </a:p>
+          <a:p>
+            <a:pPr lvl="1"/>
+            <a:r>
+              <a:rPr lang="en-US" dirty="0"/>
+              <a:t>ELK Stack (</a:t>
             </a:r>
             <a:r>
               <a:rPr lang="en-US" dirty="0" err="1"/>
-              <a:t>devs</a:t>
-            </a:r>
-            <a:r>
-              <a:rPr lang="en-US" dirty="0"/>
-              <a:t> commit changes to a single mainline branch throughout the day.</a:t>
-            </a:r>
-          </a:p>
-          <a:p>
-            <a:pPr lvl="1"/>
-            <a:r>
-              <a:rPr lang="en-US" dirty="0"/>
-              <a:t>All commits generate a build.</a:t>
-            </a:r>
-          </a:p>
-          <a:p>
-            <a:pPr lvl="1"/>
-            <a:r>
-              <a:rPr lang="en-US" dirty="0"/>
-              <a:t>All builds are tested and potentially releasable.</a:t>
-            </a:r>
-          </a:p>
-          <a:p>
-            <a:r>
-              <a:rPr lang="en-US" dirty="0"/>
-              <a:t>Continuous Delivery: a process which generates a build which may be released.</a:t>
-            </a:r>
-          </a:p>
-          <a:p>
-            <a:r>
-              <a:rPr lang="en-US" dirty="0"/>
-              <a:t>Continuous Deployment: a process which actually deploys a build.</a:t>
-            </a:r>
-          </a:p>
-          <a:p>
-            <a:pPr lvl="1"/>
+              <a:t>Elasticsearch</a:t>
+            </a:r>
+            <a:r>
+              <a:rPr lang="en-US" dirty="0"/>
+              <a:t>, </a:t>
+            </a:r>
+            <a:r>
+              <a:rPr lang="en-US" dirty="0" err="1"/>
+              <a:t>Logstash</a:t>
+            </a:r>
+            <a:r>
+              <a:rPr lang="en-US" dirty="0"/>
+              <a:t>, </a:t>
+            </a:r>
+            <a:r>
+              <a:rPr lang="en-US" dirty="0" err="1"/>
+              <a:t>Kibana</a:t>
+            </a:r>
+            <a:r>
+              <a:rPr lang="en-US" dirty="0"/>
+              <a:t>)</a:t>
+            </a:r>
+          </a:p>
+          <a:p>
+            <a:endParaRPr lang="en-US" dirty="0"/>
+          </a:p>
+          <a:p>
             <a:endParaRPr lang="en-US" dirty="0"/>
           </a:p>
         </p:txBody>
@@ -4508,7 +4406,7 @@
     </p:spTree>
     <p:extLst>
       <p:ext uri="{BB962C8B-B14F-4D97-AF65-F5344CB8AC3E}">
-        <p14:creationId xmlns:p14="http://schemas.microsoft.com/office/powerpoint/2010/main" val="606293750"/>
+        <p14:creationId xmlns:p14="http://schemas.microsoft.com/office/powerpoint/2010/main" val="1907176258"/>
       </p:ext>
     </p:extLst>
   </p:cSld>
@@ -4540,7 +4438,7 @@
           <p:cNvPr id="2" name="Title 1">
             <a:extLst>
               <a:ext uri="{FF2B5EF4-FFF2-40B4-BE49-F238E27FC236}">
-                <a16:creationId xmlns:a16="http://schemas.microsoft.com/office/drawing/2014/main" id="{0369C4F5-37BB-544F-875F-E71CCBC7783F}"/>
+                <a16:creationId xmlns:a16="http://schemas.microsoft.com/office/drawing/2014/main" id="{45BE7849-08E6-6548-A1D8-CFB5A9B9A987}"/>
               </a:ext>
             </a:extLst>
           </p:cNvPr>
@@ -4558,7 +4456,7 @@
           <a:p>
             <a:r>
               <a:rPr lang="en-US" dirty="0"/>
-              <a:t>Lecture Review</a:t>
+              <a:t>DevOps Practices Discussion</a:t>
             </a:r>
           </a:p>
         </p:txBody>
@@ -4568,7 +4466,7 @@
           <p:cNvPr id="3" name="Content Placeholder 2">
             <a:extLst>
               <a:ext uri="{FF2B5EF4-FFF2-40B4-BE49-F238E27FC236}">
-                <a16:creationId xmlns:a16="http://schemas.microsoft.com/office/drawing/2014/main" id="{7B34BD81-0456-EE4A-8044-57DBD9B85993}"/>
+                <a16:creationId xmlns:a16="http://schemas.microsoft.com/office/drawing/2014/main" id="{1990FF79-23E4-AE41-A99B-52A29762D377}"/>
               </a:ext>
             </a:extLst>
           </p:cNvPr>
@@ -4582,92 +4480,93 @@
         <p:spPr/>
         <p:txBody>
           <a:bodyPr>
-            <a:normAutofit/>
+            <a:normAutofit fontScale="92500" lnSpcReduction="20000"/>
           </a:bodyPr>
           <a:lstStyle/>
           <a:p>
             <a:r>
               <a:rPr lang="en-US" dirty="0"/>
-              <a:t>Infrastructure as Code</a:t>
-            </a:r>
+              <a:t>Please reflect on the following questions and prepare to discuss:</a:t>
+            </a:r>
+          </a:p>
+          <a:p>
+            <a:endParaRPr lang="en-US" dirty="0"/>
           </a:p>
           <a:p>
             <a:pPr lvl="1"/>
             <a:r>
-              <a:rPr lang="en-US" dirty="0"/>
-              <a:t>We can use software development practices to build infrastructure.</a:t>
-            </a:r>
+              <a:rPr lang="en-US" b="1" dirty="0"/>
+              <a:t>How do the development and operations teams work together in your organization?</a:t>
+            </a:r>
+          </a:p>
+          <a:p>
+            <a:pPr marL="457200" lvl="1" indent="0">
+              <a:buNone/>
+            </a:pPr>
+            <a:endParaRPr lang="en-US" dirty="0"/>
           </a:p>
           <a:p>
             <a:pPr lvl="1"/>
             <a:r>
-              <a:rPr lang="en-US" dirty="0"/>
-              <a:t>Version control, </a:t>
-            </a:r>
-            <a:r>
-              <a:rPr lang="en-US" dirty="0" err="1"/>
-              <a:t>linting</a:t>
-            </a:r>
-            <a:r>
-              <a:rPr lang="en-US" dirty="0"/>
-              <a:t>, integration tests, build pipelines</a:t>
-            </a:r>
-          </a:p>
-          <a:p>
-            <a:r>
-              <a:rPr lang="en-US" dirty="0"/>
-              <a:t>Metrics</a:t>
+              <a:rPr lang="en-US" b="1" dirty="0"/>
+              <a:t>How often does your organization deploy new software updates? </a:t>
+            </a:r>
+          </a:p>
+          <a:p>
+            <a:pPr lvl="2"/>
+            <a:r>
+              <a:rPr lang="en-US" dirty="0"/>
+              <a:t>What would it take to deploy faster?</a:t>
             </a:r>
           </a:p>
           <a:p>
             <a:pPr lvl="1"/>
-            <a:r>
-              <a:rPr lang="en-US" dirty="0"/>
-              <a:t>We fanatically collect data.</a:t>
-            </a:r>
+            <a:endParaRPr lang="en-US" dirty="0"/>
           </a:p>
           <a:p>
             <a:pPr lvl="1"/>
             <a:r>
-              <a:rPr lang="en-US" dirty="0"/>
-              <a:t>All decisions are supported by data.</a:t>
+              <a:rPr lang="en-US" b="1" dirty="0"/>
+              <a:t>Any concerns about developers participating in the delivery of production services? </a:t>
             </a:r>
           </a:p>
           <a:p>
             <a:pPr lvl="1"/>
-            <a:r>
-              <a:rPr lang="en-US" dirty="0"/>
-              <a:t>ELK Stack (</a:t>
-            </a:r>
-            <a:r>
-              <a:rPr lang="en-US" dirty="0" err="1"/>
-              <a:t>Elasticsearch</a:t>
-            </a:r>
-            <a:r>
-              <a:rPr lang="en-US" dirty="0"/>
-              <a:t>, </a:t>
-            </a:r>
-            <a:r>
-              <a:rPr lang="en-US" dirty="0" err="1"/>
-              <a:t>Logstash</a:t>
-            </a:r>
-            <a:r>
-              <a:rPr lang="en-US" dirty="0"/>
-              <a:t>, </a:t>
-            </a:r>
-            <a:r>
-              <a:rPr lang="en-US" dirty="0" err="1"/>
-              <a:t>Kibana</a:t>
-            </a:r>
-            <a:r>
-              <a:rPr lang="en-US" dirty="0"/>
-              <a:t>)</a:t>
-            </a:r>
-          </a:p>
-          <a:p>
             <a:endParaRPr lang="en-US" dirty="0"/>
           </a:p>
           <a:p>
+            <a:pPr lvl="1"/>
+            <a:r>
+              <a:rPr lang="en-US" b="1" dirty="0"/>
+              <a:t>Is your organization practicing continuous integration? </a:t>
+            </a:r>
+          </a:p>
+          <a:p>
+            <a:pPr lvl="2"/>
+            <a:r>
+              <a:rPr lang="en-US" dirty="0"/>
+              <a:t>If not, what's preventing it from doing so? </a:t>
+            </a:r>
+          </a:p>
+          <a:p>
+            <a:pPr lvl="2"/>
+            <a:r>
+              <a:rPr lang="en-US" dirty="0"/>
+              <a:t>How often do developers commit new code changes?</a:t>
+            </a:r>
+          </a:p>
+          <a:p>
+            <a:pPr lvl="1"/>
+            <a:endParaRPr lang="en-US" dirty="0"/>
+          </a:p>
+          <a:p>
+            <a:pPr lvl="1"/>
+            <a:endParaRPr lang="en-US" dirty="0"/>
+          </a:p>
+          <a:p>
+            <a:pPr marL="457200" lvl="1" indent="0">
+              <a:buNone/>
+            </a:pPr>
             <a:endParaRPr lang="en-US" dirty="0"/>
           </a:p>
         </p:txBody>
@@ -4675,7 +4574,7 @@
     </p:spTree>
     <p:extLst>
       <p:ext uri="{BB962C8B-B14F-4D97-AF65-F5344CB8AC3E}">
-        <p14:creationId xmlns:p14="http://schemas.microsoft.com/office/powerpoint/2010/main" val="1907176258"/>
+        <p14:creationId xmlns:p14="http://schemas.microsoft.com/office/powerpoint/2010/main" val="187189079"/>
       </p:ext>
     </p:extLst>
   </p:cSld>
@@ -4707,7 +4606,7 @@
           <p:cNvPr id="2" name="Title 1">
             <a:extLst>
               <a:ext uri="{FF2B5EF4-FFF2-40B4-BE49-F238E27FC236}">
-                <a16:creationId xmlns:a16="http://schemas.microsoft.com/office/drawing/2014/main" id="{45BE7849-08E6-6548-A1D8-CFB5A9B9A987}"/>
+                <a16:creationId xmlns:a16="http://schemas.microsoft.com/office/drawing/2014/main" id="{E13FF194-DC87-3B42-A050-6E8E5B014760}"/>
               </a:ext>
             </a:extLst>
           </p:cNvPr>
@@ -4725,7 +4624,7 @@
           <a:p>
             <a:r>
               <a:rPr lang="en-US" dirty="0"/>
-              <a:t>DevOps Practices Discussion</a:t>
+              <a:t>Classroom Project</a:t>
             </a:r>
           </a:p>
         </p:txBody>
@@ -4735,7 +4634,7 @@
           <p:cNvPr id="3" name="Content Placeholder 2">
             <a:extLst>
               <a:ext uri="{FF2B5EF4-FFF2-40B4-BE49-F238E27FC236}">
-                <a16:creationId xmlns:a16="http://schemas.microsoft.com/office/drawing/2014/main" id="{1990FF79-23E4-AE41-A99B-52A29762D377}"/>
+                <a16:creationId xmlns:a16="http://schemas.microsoft.com/office/drawing/2014/main" id="{49A699BF-6AED-7348-9DA9-0B24E933E6E3}"/>
               </a:ext>
             </a:extLst>
           </p:cNvPr>
@@ -4748,94 +4647,38 @@
         </p:nvSpPr>
         <p:spPr/>
         <p:txBody>
-          <a:bodyPr>
-            <a:normAutofit fontScale="92500" lnSpcReduction="20000"/>
-          </a:bodyPr>
-          <a:lstStyle/>
-          <a:p>
-            <a:r>
-              <a:rPr lang="en-US" dirty="0"/>
-              <a:t>Please reflect on the following questions and prepare to discuss:</a:t>
+          <a:bodyPr/>
+          <a:lstStyle/>
+          <a:p>
+            <a:r>
+              <a:rPr lang="en-US" dirty="0"/>
+              <a:t>Overview: </a:t>
+            </a:r>
+          </a:p>
+          <a:p>
+            <a:pPr lvl="1"/>
+            <a:r>
+              <a:rPr lang="en-US" dirty="0"/>
+              <a:t>Quick overview of Jenkins CI/CD</a:t>
+            </a:r>
+          </a:p>
+          <a:p>
+            <a:pPr lvl="1"/>
+            <a:r>
+              <a:rPr lang="en-US" dirty="0"/>
+              <a:t>Build a small infrastructure pipeline which launches an EC2 instance.</a:t>
             </a:r>
           </a:p>
           <a:p>
             <a:endParaRPr lang="en-US" dirty="0"/>
           </a:p>
           <a:p>
-            <a:pPr lvl="1"/>
-            <a:r>
-              <a:rPr lang="en-US" b="1" dirty="0"/>
-              <a:t>How do the development and operations teams work together in your organization?</a:t>
-            </a:r>
-          </a:p>
-          <a:p>
-            <a:pPr marL="457200" lvl="1" indent="0">
-              <a:buNone/>
-            </a:pPr>
-            <a:endParaRPr lang="en-US" dirty="0"/>
-          </a:p>
-          <a:p>
-            <a:pPr lvl="1"/>
-            <a:r>
-              <a:rPr lang="en-US" b="1" dirty="0"/>
-              <a:t>How often does your organization deploy new software updates? </a:t>
-            </a:r>
-          </a:p>
-          <a:p>
-            <a:pPr lvl="2"/>
-            <a:r>
-              <a:rPr lang="en-US" dirty="0"/>
-              <a:t>What would it take to deploy faster?</a:t>
-            </a:r>
-          </a:p>
-          <a:p>
-            <a:pPr lvl="1"/>
-            <a:endParaRPr lang="en-US" dirty="0"/>
-          </a:p>
-          <a:p>
-            <a:pPr lvl="1"/>
-            <a:r>
-              <a:rPr lang="en-US" b="1" dirty="0"/>
-              <a:t>Any concerns about developers participating in the delivery of production services? </a:t>
-            </a:r>
-          </a:p>
-          <a:p>
-            <a:pPr lvl="1"/>
-            <a:endParaRPr lang="en-US" dirty="0"/>
-          </a:p>
-          <a:p>
-            <a:pPr lvl="1"/>
-            <a:r>
-              <a:rPr lang="en-US" b="1" dirty="0"/>
-              <a:t>Is your organization practicing continuous integration? </a:t>
-            </a:r>
-          </a:p>
-          <a:p>
-            <a:pPr lvl="2"/>
-            <a:r>
-              <a:rPr lang="en-US" dirty="0"/>
-              <a:t>If not, what's preventing it from doing so? </a:t>
-            </a:r>
-          </a:p>
-          <a:p>
-            <a:pPr lvl="2"/>
-            <a:r>
-              <a:rPr lang="en-US" dirty="0"/>
-              <a:t>How often do developers commit new code changes?</a:t>
-            </a:r>
-          </a:p>
-          <a:p>
-            <a:pPr lvl="1"/>
-            <a:endParaRPr lang="en-US" dirty="0"/>
-          </a:p>
-          <a:p>
-            <a:pPr lvl="1"/>
-            <a:endParaRPr lang="en-US" dirty="0"/>
-          </a:p>
-          <a:p>
-            <a:pPr marL="457200" lvl="1" indent="0">
-              <a:buNone/>
-            </a:pPr>
+            <a:r>
+              <a:rPr lang="en-US" dirty="0"/>
+              <a:t>Show me your work when completed!</a:t>
+            </a:r>
+          </a:p>
+          <a:p>
             <a:endParaRPr lang="en-US" dirty="0"/>
           </a:p>
         </p:txBody>
@@ -4843,7 +4686,7 @@
     </p:spTree>
     <p:extLst>
       <p:ext uri="{BB962C8B-B14F-4D97-AF65-F5344CB8AC3E}">
-        <p14:creationId xmlns:p14="http://schemas.microsoft.com/office/powerpoint/2010/main" val="187189079"/>
+        <p14:creationId xmlns:p14="http://schemas.microsoft.com/office/powerpoint/2010/main" val="1208524681"/>
       </p:ext>
     </p:extLst>
   </p:cSld>

</xml_diff>